<commit_message>
mejoras al sistema falta solo usario administrador
</commit_message>
<xml_diff>
--- a/Sis_Reservas_Alex.pptx
+++ b/Sis_Reservas_Alex.pptx
@@ -8887,14 +8887,14 @@
               <a:t>E</a:t>
             </a:r>
             <a:r>
-              <a:rPr lang="es-PE" sz="2400" b="1" dirty="0">
+              <a:rPr lang="es-PE" sz="2400" b="1" dirty="0" err="1">
                 <a:solidFill>
                   <a:srgbClr val="1A5275"/>
                 </a:solidFill>
                 <a:latin typeface="Times New Roman"/>
                 <a:cs typeface="Times New Roman"/>
               </a:rPr>
-              <a:t>específicos</a:t>
+              <a:t>specíficos</a:t>
             </a:r>
             <a:endParaRPr lang="es-PE" sz="2400" dirty="0">
               <a:latin typeface="Times New Roman"/>

</xml_diff>